<commit_message>
update with minor edits
</commit_message>
<xml_diff>
--- a/assets/files/FDIC-Automated-Business-Workflow_ITACM-DEC-2025.pptx
+++ b/assets/files/FDIC-Automated-Business-Workflow_ITACM-DEC-2025.pptx
@@ -251,7 +251,7 @@
           <a:p>
             <a:fld id="{C0B699CC-86F4-43BE-B8FA-1BE1719A0127}" type="datetimeFigureOut">
               <a:rPr lang="en-US" smtClean="0"/>
-              <a:t>12/4/2025</a:t>
+              <a:t>12/9/25</a:t>
             </a:fld>
             <a:endParaRPr lang="en-US"/>
           </a:p>
@@ -648,35 +648,17 @@
           <a:p>
             <a:r>
               <a:rPr lang="en-US" dirty="0"/>
-              <a:t>Add new slide- quick poll- how much does the FDIC insure deposits – </a:t>
-            </a:r>
+              <a:t>Jenny to Launch Poll, Brooke to read poll, answer in poll module, chat or Q&amp;A </a:t>
+            </a:r>
+          </a:p>
+          <a:p>
+            <a:endParaRPr lang="en-US" dirty="0"/>
           </a:p>
           <a:p>
             <a:r>
               <a:rPr lang="en-US" dirty="0"/>
-              <a:t>$250,000</a:t>
-            </a:r>
-          </a:p>
-          <a:p>
-            <a:r>
-              <a:rPr lang="en-US" dirty="0"/>
-              <a:t>150,000 </a:t>
-            </a:r>
-          </a:p>
-          <a:p>
-            <a:r>
-              <a:rPr lang="en-US" dirty="0"/>
-              <a:t>100,000</a:t>
-            </a:r>
-          </a:p>
-          <a:p>
-            <a:r>
-              <a:rPr lang="en-US" dirty="0"/>
-              <a:t>300,000</a:t>
-            </a:r>
-          </a:p>
-          <a:p>
-            <a:endParaRPr lang="en-US" dirty="0"/>
+              <a:t>Answer: FDIC deposit insurance covers $250,000 per depositor, per FDIC-insured bank, for each account ownership category.</a:t>
+            </a:r>
           </a:p>
         </p:txBody>
       </p:sp>
@@ -760,18 +742,7 @@
           <a:bodyPr/>
           <a:lstStyle/>
           <a:p>
-            <a:r>
-              <a:rPr lang="en-US" dirty="0"/>
-              <a:t>Switch this </a:t>
-            </a:r>
-            <a:r>
-              <a:rPr lang="en-US"/>
-              <a:t>to Field </a:t>
-            </a:r>
-            <a:r>
-              <a:rPr lang="en-US" dirty="0"/>
-              <a:t>of Dreams image</a:t>
-            </a:r>
+            <a:endParaRPr lang="en-US" dirty="0"/>
           </a:p>
         </p:txBody>
       </p:sp>
@@ -9919,12 +9890,17 @@
         </p:blipFill>
         <p:spPr>
           <a:xfrm>
-            <a:off x="77626" y="1361797"/>
+            <a:off x="157680" y="1394130"/>
             <a:ext cx="11876640" cy="4069739"/>
           </a:xfrm>
           <a:prstGeom prst="rect">
             <a:avLst/>
           </a:prstGeom>
+          <a:ln w="12700">
+            <a:solidFill>
+              <a:schemeClr val="tx1"/>
+            </a:solidFill>
+          </a:ln>
         </p:spPr>
       </p:pic>
       <p:sp>
@@ -10015,7 +9991,7 @@
             <a:pPr algn="ctr"/>
             <a:r>
               <a:rPr lang="en-US" dirty="0"/>
-              <a:t> Ticket Management &amp; Expectations </a:t>
+              <a:t> Ticket Management and Expectations </a:t>
             </a:r>
           </a:p>
         </p:txBody>
@@ -10038,8 +10014,8 @@
         </p:nvSpPr>
         <p:spPr>
           <a:xfrm>
-            <a:off x="754696" y="862275"/>
-            <a:ext cx="10515597" cy="4929768"/>
+            <a:off x="754696" y="912515"/>
+            <a:ext cx="10515597" cy="2516485"/>
           </a:xfrm>
         </p:spPr>
         <p:txBody>
@@ -10078,9 +10054,16 @@
             </a:r>
           </a:p>
           <a:p>
+            <a:pPr marL="342900" indent="-342900">
+              <a:buFont typeface="Arial" panose="020B0604020202020204" pitchFamily="34" charset="0"/>
+              <a:buChar char="•"/>
+            </a:pPr>
+            <a:endParaRPr lang="en-US" sz="2600" b="1" u="sng" dirty="0"/>
+          </a:p>
+          <a:p>
             <a:pPr algn="ctr"/>
             <a:r>
-              <a:rPr lang="en-US" sz="2800" b="1" u="sng" dirty="0"/>
+              <a:rPr lang="en-US" sz="2600" b="1" u="sng" dirty="0"/>
               <a:t>Examples of expectations within ServiceNow modules</a:t>
             </a:r>
           </a:p>
@@ -10108,12 +10091,59 @@
           </a:p>
         </p:txBody>
       </p:sp>
+      <p:sp>
+        <p:nvSpPr>
+          <p:cNvPr id="5" name="Rectangle 4">
+            <a:extLst>
+              <a:ext uri="{FF2B5EF4-FFF2-40B4-BE49-F238E27FC236}">
+                <a16:creationId xmlns:a16="http://schemas.microsoft.com/office/drawing/2014/main" id="{6CA1108B-19B1-580A-4A85-084E0FC77364}"/>
+              </a:ext>
+            </a:extLst>
+          </p:cNvPr>
+          <p:cNvSpPr/>
+          <p:nvPr/>
+        </p:nvSpPr>
+        <p:spPr>
+          <a:xfrm>
+            <a:off x="1366576" y="3429000"/>
+            <a:ext cx="9589894" cy="3354782"/>
+          </a:xfrm>
+          <a:prstGeom prst="rect">
+            <a:avLst/>
+          </a:prstGeom>
+          <a:noFill/>
+        </p:spPr>
+        <p:style>
+          <a:lnRef idx="2">
+            <a:schemeClr val="accent1">
+              <a:shade val="15000"/>
+            </a:schemeClr>
+          </a:lnRef>
+          <a:fillRef idx="1">
+            <a:schemeClr val="accent1"/>
+          </a:fillRef>
+          <a:effectRef idx="0">
+            <a:schemeClr val="accent1"/>
+          </a:effectRef>
+          <a:fontRef idx="minor">
+            <a:schemeClr val="lt1"/>
+          </a:fontRef>
+        </p:style>
+        <p:txBody>
+          <a:bodyPr rtlCol="0" anchor="ctr"/>
+          <a:lstStyle/>
+          <a:p>
+            <a:pPr algn="ctr"/>
+            <a:endParaRPr lang="en-US"/>
+          </a:p>
+        </p:txBody>
+      </p:sp>
       <p:pic>
         <p:nvPicPr>
-          <p:cNvPr id="6" name="Picture 5" descr="Note within the Service Now Document Request module: Please allow 7 to 10 business days for Document Remediation Services ">
-            <a:extLst>
-              <a:ext uri="{FF2B5EF4-FFF2-40B4-BE49-F238E27FC236}">
-                <a16:creationId xmlns:a16="http://schemas.microsoft.com/office/drawing/2014/main" id="{F7E1617A-3913-0610-C683-5C96D47E1430}"/>
+          <p:cNvPr id="10" name="Picture 9" descr="Within the Service Now ICT Application Testing Module: Calendar Section for a Request start date, Calendar Selection for a request end date, Allow 3 to 4 weeks for testing">
+            <a:extLst>
+              <a:ext uri="{FF2B5EF4-FFF2-40B4-BE49-F238E27FC236}">
+                <a16:creationId xmlns:a16="http://schemas.microsoft.com/office/drawing/2014/main" id="{806AF6CB-C5F2-C6C6-ACEF-D54A6DF4FF61}"/>
               </a:ext>
             </a:extLst>
           </p:cNvPr>
@@ -10130,8 +10160,8 @@
         </p:blipFill>
         <p:spPr>
           <a:xfrm>
-            <a:off x="1638058" y="3869679"/>
-            <a:ext cx="6609524" cy="447619"/>
+            <a:off x="1572191" y="4209810"/>
+            <a:ext cx="4523809" cy="2342857"/>
           </a:xfrm>
           <a:prstGeom prst="rect">
             <a:avLst/>
@@ -10140,10 +10170,10 @@
       </p:pic>
       <p:pic>
         <p:nvPicPr>
-          <p:cNvPr id="10" name="Picture 9" descr="Within the Service Now ICT Application Testing Module: Calendar Section for a Request start date, Calendar Selection for a request end date, Allow 3 to 4 weeks for testing">
-            <a:extLst>
-              <a:ext uri="{FF2B5EF4-FFF2-40B4-BE49-F238E27FC236}">
-                <a16:creationId xmlns:a16="http://schemas.microsoft.com/office/drawing/2014/main" id="{806AF6CB-C5F2-C6C6-ACEF-D54A6DF4FF61}"/>
+          <p:cNvPr id="8" name="Picture 7" descr="Note within Service Now ICT application testing module: Test Request details: NOTE: Start date doesn't begin until access has been granted ">
+            <a:extLst>
+              <a:ext uri="{FF2B5EF4-FFF2-40B4-BE49-F238E27FC236}">
+                <a16:creationId xmlns:a16="http://schemas.microsoft.com/office/drawing/2014/main" id="{C267D50D-9415-C3C0-17EA-989C1BB88351}"/>
               </a:ext>
             </a:extLst>
           </p:cNvPr>
@@ -10160,38 +10190,8 @@
         </p:blipFill>
         <p:spPr>
           <a:xfrm>
-            <a:off x="1572191" y="4440925"/>
-            <a:ext cx="4523809" cy="2342857"/>
-          </a:xfrm>
-          <a:prstGeom prst="rect">
-            <a:avLst/>
-          </a:prstGeom>
-        </p:spPr>
-      </p:pic>
-      <p:pic>
-        <p:nvPicPr>
-          <p:cNvPr id="8" name="Picture 7" descr="Note within Service Now ICT application testing module: Test Request details: NOTE: Start date doesn't begin until access has been granted ">
-            <a:extLst>
-              <a:ext uri="{FF2B5EF4-FFF2-40B4-BE49-F238E27FC236}">
-                <a16:creationId xmlns:a16="http://schemas.microsoft.com/office/drawing/2014/main" id="{C267D50D-9415-C3C0-17EA-989C1BB88351}"/>
-              </a:ext>
-            </a:extLst>
-          </p:cNvPr>
-          <p:cNvPicPr>
-            <a:picLocks noChangeAspect="1"/>
-          </p:cNvPicPr>
-          <p:nvPr/>
-        </p:nvPicPr>
-        <p:blipFill>
-          <a:blip r:embed="rId4"/>
-          <a:stretch>
-            <a:fillRect/>
-          </a:stretch>
-        </p:blipFill>
-        <p:spPr>
-          <a:xfrm>
-            <a:off x="6460166" y="4771437"/>
-            <a:ext cx="4514286" cy="1133333"/>
+            <a:off x="6460166" y="4540322"/>
+            <a:ext cx="4365258" cy="1133333"/>
           </a:xfrm>
           <a:prstGeom prst="rect">
             <a:avLst/>
@@ -10291,7 +10291,7 @@
             <a:pPr algn="ctr"/>
             <a:r>
               <a:rPr lang="en-US" dirty="0"/>
-              <a:t>Reporting &amp; Executive Feedback  </a:t>
+              <a:t>Reporting and Executive Feedback  </a:t>
             </a:r>
           </a:p>
         </p:txBody>
@@ -10394,6 +10394,11 @@
           <a:solidFill>
             <a:srgbClr val="FFFFFF"/>
           </a:solidFill>
+          <a:ln w="12700">
+            <a:solidFill>
+              <a:schemeClr val="tx1"/>
+            </a:solidFill>
+          </a:ln>
         </p:spPr>
       </p:pic>
       <p:pic>
@@ -10424,6 +10429,11 @@
           <a:prstGeom prst="rect">
             <a:avLst/>
           </a:prstGeom>
+          <a:ln w="12700">
+            <a:solidFill>
+              <a:schemeClr val="tx1"/>
+            </a:solidFill>
+          </a:ln>
         </p:spPr>
       </p:pic>
       <p:sp>
@@ -10523,6 +10533,7 @@
           <a:bodyPr/>
           <a:lstStyle/>
           <a:p>
+            <a:pPr algn="ctr"/>
             <a:r>
               <a:rPr lang="en-US" dirty="0"/>
               <a:t>How to Request a 508 Service</a:t>
@@ -10540,33 +10551,38 @@
             <p:ph idx="1"/>
           </p:nvPr>
         </p:nvSpPr>
-        <p:spPr/>
+        <p:spPr>
+          <a:xfrm>
+            <a:off x="838202" y="1258694"/>
+            <a:ext cx="10515597" cy="4636920"/>
+          </a:xfrm>
+        </p:spPr>
         <p:txBody>
           <a:bodyPr vert="horz" lIns="91440" tIns="45720" rIns="91440" bIns="45720" numCol="1" rtlCol="0" anchor="t">
-            <a:normAutofit/>
+            <a:noAutofit/>
           </a:bodyPr>
           <a:lstStyle/>
           <a:p>
-            <a:endParaRPr lang="en-US" dirty="0"/>
-          </a:p>
-          <a:p>
-            <a:r>
-              <a:rPr lang="en-US" dirty="0">
+            <a:endParaRPr lang="en-US" sz="3000" dirty="0"/>
+          </a:p>
+          <a:p>
+            <a:r>
+              <a:rPr lang="en-US" sz="3000" dirty="0">
                 <a:hlinkClick r:id="rId2"/>
               </a:rPr>
               <a:t>FDIC Section 508 Intranet Site </a:t>
             </a:r>
             <a:r>
-              <a:rPr lang="en-US" dirty="0"/>
+              <a:rPr lang="en-US" sz="3000" dirty="0"/>
               <a:t>– The FDIC’s internal site for information and resources on Section 508 compliancy.</a:t>
             </a:r>
           </a:p>
           <a:p>
-            <a:endParaRPr lang="en-US" dirty="0"/>
-          </a:p>
-          <a:p>
-            <a:r>
-              <a:rPr lang="en-US" dirty="0">
+            <a:endParaRPr lang="en-US" sz="3000" dirty="0"/>
+          </a:p>
+          <a:p>
+            <a:r>
+              <a:rPr lang="en-US" sz="3000" dirty="0">
                 <a:latin typeface="Source Sans Pro"/>
                 <a:ea typeface="Source Sans Pro"/>
                 <a:hlinkClick r:id="rId3"/>
@@ -10574,34 +10590,34 @@
               <a:t>Section 508 Service Now Portal </a:t>
             </a:r>
             <a:r>
-              <a:rPr lang="en-US" dirty="0">
+              <a:rPr lang="en-US" sz="3000" dirty="0">
                 <a:latin typeface="Source Sans Pro"/>
                 <a:ea typeface="Source Sans Pro"/>
               </a:rPr>
               <a:t> - Any </a:t>
             </a:r>
             <a:r>
-              <a:rPr lang="en-US" dirty="0"/>
+              <a:rPr lang="en-US" sz="3000" dirty="0"/>
               <a:t>Section 508 Service requests (Application Test Requests, Document Reviews, Trainings, etc..) can be made here. </a:t>
             </a:r>
           </a:p>
           <a:p>
-            <a:endParaRPr lang="en-US" dirty="0"/>
-          </a:p>
-          <a:p>
-            <a:r>
-              <a:rPr lang="en-US" dirty="0">
+            <a:endParaRPr lang="en-US" sz="3000" dirty="0"/>
+          </a:p>
+          <a:p>
+            <a:r>
+              <a:rPr lang="en-US" sz="3000" dirty="0">
                 <a:hlinkClick r:id="rId4"/>
               </a:rPr>
               <a:t>Section508@fdic.gov</a:t>
             </a:r>
             <a:r>
-              <a:rPr lang="en-US" dirty="0"/>
+              <a:rPr lang="en-US" sz="3000" dirty="0"/>
               <a:t> – Use this email address to reach out to the entire team for any questions about Section 508.</a:t>
             </a:r>
           </a:p>
           <a:p>
-            <a:endParaRPr lang="en-US" dirty="0"/>
+            <a:endParaRPr lang="en-US" sz="3000" dirty="0"/>
           </a:p>
         </p:txBody>
       </p:sp>
@@ -10851,7 +10867,7 @@
         <p:spPr>
           <a:xfrm>
             <a:off x="5829701" y="1518053"/>
-            <a:ext cx="5524097" cy="4237854"/>
+            <a:ext cx="5876629" cy="4237854"/>
           </a:xfrm>
         </p:spPr>
         <p:txBody>
@@ -11045,7 +11061,7 @@
         </p:blipFill>
         <p:spPr bwMode="auto">
           <a:xfrm>
-            <a:off x="838201" y="1825625"/>
+            <a:off x="838201" y="1544277"/>
             <a:ext cx="5181600" cy="4351338"/>
           </a:xfrm>
           <a:prstGeom prst="rect">
@@ -11314,7 +11330,21 @@
               <a:rPr lang="en-US" dirty="0">
                 <a:latin typeface="+mn-lt"/>
               </a:rPr>
-              <a:t>to XXXX, per depositor, per insured 	bank, for each account ownership 	category</a:t>
+              <a:t>to </a:t>
+            </a:r>
+            <a:r>
+              <a:rPr lang="en-US" b="1" u="sng" dirty="0"/>
+              <a:t>$XXXX</a:t>
+            </a:r>
+            <a:r>
+              <a:rPr lang="en-US" sz="1800" dirty="0"/>
+              <a:t>,</a:t>
+            </a:r>
+            <a:r>
+              <a:rPr lang="en-US" dirty="0">
+                <a:latin typeface="+mn-lt"/>
+              </a:rPr>
+              <a:t> per depositor, per	insured bank, for each account 	ownership category</a:t>
             </a:r>
           </a:p>
           <a:p>
@@ -11542,6 +11572,11 @@
           <a:prstGeom prst="rect">
             <a:avLst/>
           </a:prstGeom>
+          <a:ln w="12700">
+            <a:solidFill>
+              <a:schemeClr val="tx1"/>
+            </a:solidFill>
+          </a:ln>
         </p:spPr>
       </p:pic>
       <p:sp>
@@ -11558,8 +11593,8 @@
         </p:nvSpPr>
         <p:spPr>
           <a:xfrm>
-            <a:off x="3109366" y="3301710"/>
-            <a:ext cx="1441298" cy="369332"/>
+            <a:off x="3069173" y="3301710"/>
+            <a:ext cx="1611753" cy="369332"/>
           </a:xfrm>
           <a:prstGeom prst="rect">
             <a:avLst/>
@@ -11614,6 +11649,11 @@
           <a:prstGeom prst="rect">
             <a:avLst/>
           </a:prstGeom>
+          <a:ln w="12700">
+            <a:solidFill>
+              <a:schemeClr val="tx1"/>
+            </a:solidFill>
+          </a:ln>
         </p:spPr>
       </p:pic>
       <p:sp>
@@ -11686,6 +11726,11 @@
           <a:prstGeom prst="rect">
             <a:avLst/>
           </a:prstGeom>
+          <a:ln w="12700">
+            <a:solidFill>
+              <a:schemeClr val="tx1"/>
+            </a:solidFill>
+          </a:ln>
         </p:spPr>
       </p:pic>
       <p:sp>
@@ -11758,6 +11803,11 @@
           <a:prstGeom prst="rect">
             <a:avLst/>
           </a:prstGeom>
+          <a:ln w="12700">
+            <a:solidFill>
+              <a:schemeClr val="tx1"/>
+            </a:solidFill>
+          </a:ln>
         </p:spPr>
       </p:pic>
       <p:sp>
@@ -11830,6 +11880,11 @@
           <a:prstGeom prst="rect">
             <a:avLst/>
           </a:prstGeom>
+          <a:ln w="12700">
+            <a:solidFill>
+              <a:schemeClr val="tx1"/>
+            </a:solidFill>
+          </a:ln>
         </p:spPr>
       </p:pic>
       <p:sp>
@@ -12062,11 +12117,11 @@
             </a:pPr>
             <a:r>
               <a:rPr lang="en-US" sz="2800" dirty="0"/>
-              <a:t>Keep in mind - FDIC is a unique agency </a:t>
+              <a:t>Keep in mind - FDIC is a unique agency</a:t>
             </a:r>
             <a:r>
               <a:rPr lang="en-US" sz="1800" dirty="0"/>
-              <a:t>(we do not follow the FAR) </a:t>
+              <a:t> </a:t>
             </a:r>
           </a:p>
           <a:p>
@@ -12507,6 +12562,11 @@
           <a:prstGeom prst="rect">
             <a:avLst/>
           </a:prstGeom>
+          <a:ln w="12700">
+            <a:solidFill>
+              <a:schemeClr val="tx1"/>
+            </a:solidFill>
+          </a:ln>
         </p:spPr>
       </p:pic>
       <p:sp>
@@ -12815,7 +12875,7 @@
           <a:p>
             <a:pPr algn="ctr"/>
             <a:r>
-              <a:rPr lang="en-US" sz="3600" dirty="0"/>
+              <a:rPr lang="en-US" dirty="0"/>
               <a:t>Requirements </a:t>
             </a:r>
           </a:p>
@@ -13009,6 +13069,11 @@
           <a:prstGeom prst="rect">
             <a:avLst/>
           </a:prstGeom>
+          <a:ln w="12700">
+            <a:solidFill>
+              <a:schemeClr val="tx1"/>
+            </a:solidFill>
+          </a:ln>
         </p:spPr>
       </p:pic>
       <p:sp>
@@ -13198,6 +13263,11 @@
           <a:prstGeom prst="rect">
             <a:avLst/>
           </a:prstGeom>
+          <a:ln w="12700">
+            <a:solidFill>
+              <a:schemeClr val="tx1"/>
+            </a:solidFill>
+          </a:ln>
         </p:spPr>
       </p:pic>
       <p:sp>
@@ -14542,6 +14612,15 @@
 </file>
 
 <file path=customXml/item2.xml><?xml version="1.0" encoding="utf-8"?>
+<?mso-contentType ?>
+<FormTemplates xmlns="http://schemas.microsoft.com/sharepoint/v3/contenttype/forms">
+  <Display>DocumentLibraryForm</Display>
+  <Edit>DocumentLibraryForm</Edit>
+  <New>DocumentLibraryForm</New>
+</FormTemplates>
+</file>
+
+<file path=customXml/item3.xml><?xml version="1.0" encoding="utf-8"?>
 <p:properties xmlns:p="http://schemas.microsoft.com/office/2006/metadata/properties" xmlns:xsi="http://www.w3.org/2001/XMLSchema-instance" xmlns:pc="http://schemas.microsoft.com/office/infopath/2007/PartnerControls">
   <documentManagement>
     <TaxCatchAll xmlns="00dc60f3-7cd2-47cf-a0f6-ce37dfcd6526" xsi:nil="true"/>
@@ -14550,15 +14629,6 @@
     </lcf76f155ced4ddcb4097134ff3c332f>
   </documentManagement>
 </p:properties>
-</file>
-
-<file path=customXml/item3.xml><?xml version="1.0" encoding="utf-8"?>
-<?mso-contentType ?>
-<FormTemplates xmlns="http://schemas.microsoft.com/sharepoint/v3/contenttype/forms">
-  <Display>DocumentLibraryForm</Display>
-  <Edit>DocumentLibraryForm</Edit>
-  <New>DocumentLibraryForm</New>
-</FormTemplates>
 </file>
 
 <file path=customXml/itemProps1.xml><?xml version="1.0" encoding="utf-8"?>
@@ -14582,6 +14652,14 @@
 </file>
 
 <file path=customXml/itemProps2.xml><?xml version="1.0" encoding="utf-8"?>
+<ds:datastoreItem xmlns:ds="http://schemas.openxmlformats.org/officeDocument/2006/customXml" ds:itemID="{EF8CAAC2-A29C-4BA3-AE05-6FD3A250D514}">
+  <ds:schemaRefs>
+    <ds:schemaRef ds:uri="http://schemas.microsoft.com/sharepoint/v3/contenttype/forms"/>
+  </ds:schemaRefs>
+</ds:datastoreItem>
+</file>
+
+<file path=customXml/itemProps3.xml><?xml version="1.0" encoding="utf-8"?>
 <ds:datastoreItem xmlns:ds="http://schemas.openxmlformats.org/officeDocument/2006/customXml" ds:itemID="{48D8BBAE-7115-4DF4-9776-1F6CFBE2E26D}">
   <ds:schemaRefs>
     <ds:schemaRef ds:uri="fb965e4d-dc99-4cb0-9349-553d046c649f"/>
@@ -14597,12 +14675,4 @@
     <ds:schemaRef ds:uri="00dc60f3-7cd2-47cf-a0f6-ce37dfcd6526"/>
   </ds:schemaRefs>
 </ds:datastoreItem>
-</file>
-
-<file path=customXml/itemProps3.xml><?xml version="1.0" encoding="utf-8"?>
-<ds:datastoreItem xmlns:ds="http://schemas.openxmlformats.org/officeDocument/2006/customXml" ds:itemID="{EF8CAAC2-A29C-4BA3-AE05-6FD3A250D514}">
-  <ds:schemaRefs>
-    <ds:schemaRef ds:uri="http://schemas.microsoft.com/sharepoint/v3/contenttype/forms"/>
-  </ds:schemaRefs>
-</ds:datastoreItem>
 </file>
</xml_diff>